<commit_message>
task_3 chart screenshot added
</commit_message>
<xml_diff>
--- a/Grape to Glass.pptx
+++ b/Grape to Glass.pptx
@@ -14664,8 +14664,8 @@
         </p:nvGrpSpPr>
         <p:grpSpPr>
           <a:xfrm>
-            <a:off x="200722" y="1113887"/>
-            <a:ext cx="17685834" cy="8864287"/>
+            <a:off x="200722" y="1028701"/>
+            <a:ext cx="17685834" cy="8949474"/>
             <a:chOff x="0" y="-38100"/>
             <a:chExt cx="3155931" cy="1559418"/>
           </a:xfrm>
@@ -15105,8 +15105,8 @@
         </p:nvSpPr>
         <p:spPr>
           <a:xfrm>
-            <a:off x="505522" y="4944443"/>
-            <a:ext cx="17276955" cy="4136517"/>
+            <a:off x="505523" y="4944443"/>
+            <a:ext cx="9248078" cy="5515356"/>
           </a:xfrm>
           <a:prstGeom prst="rect">
             <a:avLst/>
@@ -15224,6 +15224,36 @@
           </a:p>
         </p:txBody>
       </p:sp>
+      <p:pic>
+        <p:nvPicPr>
+          <p:cNvPr id="5" name="Picture 4">
+            <a:extLst>
+              <a:ext uri="{FF2B5EF4-FFF2-40B4-BE49-F238E27FC236}">
+                <a16:creationId xmlns:a16="http://schemas.microsoft.com/office/drawing/2014/main" id="{FC841499-A5DD-E0DD-4600-210A8D355D0D}"/>
+              </a:ext>
+            </a:extLst>
+          </p:cNvPr>
+          <p:cNvPicPr>
+            <a:picLocks noChangeAspect="1"/>
+          </p:cNvPicPr>
+          <p:nvPr/>
+        </p:nvPicPr>
+        <p:blipFill>
+          <a:blip r:embed="rId5"/>
+          <a:stretch>
+            <a:fillRect/>
+          </a:stretch>
+        </p:blipFill>
+        <p:spPr>
+          <a:xfrm>
+            <a:off x="10936953" y="4247100"/>
+            <a:ext cx="6874063" cy="5949730"/>
+          </a:xfrm>
+          <a:prstGeom prst="rect">
+            <a:avLst/>
+          </a:prstGeom>
+        </p:spPr>
+      </p:pic>
     </p:spTree>
   </p:cSld>
   <p:clrMapOvr>

</xml_diff>